<commit_message>
readme update and notes
</commit_message>
<xml_diff>
--- a/Capstone Presentation.pptx
+++ b/Capstone Presentation.pptx
@@ -12396,13 +12396,13 @@
   <p:clrMapOvr>
     <a:masterClrMapping/>
   </p:clrMapOvr>
-  <mc:AlternateContent xmlns:mc="http://schemas.openxmlformats.org/markup-compatibility/2006">
-    <mc:Choice xmlns:p14="http://schemas.microsoft.com/office/powerpoint/2010/main" Requires="p14">
+  <mc:AlternateContent xmlns:mc="http://schemas.openxmlformats.org/markup-compatibility/2006" xmlns:p14="http://schemas.microsoft.com/office/powerpoint/2010/main">
+    <mc:Choice Requires="p14">
       <p:transition spd="med" p14:dur="700">
         <p:fade/>
       </p:transition>
     </mc:Choice>
-    <mc:Fallback>
+    <mc:Fallback xmlns="">
       <p:transition spd="med">
         <p:fade/>
       </p:transition>
@@ -15088,28 +15088,28 @@
             <a:pPr lvl="1"/>
             <a:r>
               <a:rPr lang="en-US" dirty="0"/>
-              <a:t>L-Rail Routes</a:t>
+              <a:t>L-Rail Lines</a:t>
             </a:r>
           </a:p>
           <a:p>
             <a:pPr lvl="1"/>
             <a:r>
               <a:rPr lang="en-US" dirty="0"/>
-              <a:t>L-Rail Stops</a:t>
+              <a:t>L-Rail Stations</a:t>
             </a:r>
           </a:p>
           <a:p>
             <a:pPr lvl="1"/>
             <a:r>
               <a:rPr lang="en-US" dirty="0"/>
-              <a:t>Metra Route</a:t>
+              <a:t>Metra Lines</a:t>
             </a:r>
           </a:p>
           <a:p>
             <a:pPr lvl="1"/>
             <a:r>
               <a:rPr lang="en-US" dirty="0"/>
-              <a:t>Metra Stops</a:t>
+              <a:t>Metra Stations</a:t>
             </a:r>
           </a:p>
           <a:p>
@@ -16486,21 +16486,21 @@
 </file>
 
 <file path=customXml/item1.xml><?xml version="1.0" encoding="utf-8"?>
+<?mso-contentType ?>
+<FormTemplates xmlns="http://schemas.microsoft.com/sharepoint/v3/contenttype/forms">
+  <Display>DocumentLibraryForm</Display>
+  <Edit>DocumentLibraryForm</Edit>
+  <New>DocumentLibraryForm</New>
+</FormTemplates>
+</file>
+
+<file path=customXml/item2.xml><?xml version="1.0" encoding="utf-8"?>
 <p:properties xmlns:p="http://schemas.microsoft.com/office/2006/metadata/properties" xmlns:xsi="http://www.w3.org/2001/XMLSchema-instance" xmlns:pc="http://schemas.microsoft.com/office/infopath/2007/PartnerControls">
   <documentManagement>
     <Status xmlns="71af3243-3dd4-4a8d-8c0d-dd76da1f02a5">Not started</Status>
     <MediaServiceKeyPoints xmlns="71af3243-3dd4-4a8d-8c0d-dd76da1f02a5" xsi:nil="true"/>
   </documentManagement>
 </p:properties>
-</file>
-
-<file path=customXml/item2.xml><?xml version="1.0" encoding="utf-8"?>
-<?mso-contentType ?>
-<FormTemplates xmlns="http://schemas.microsoft.com/sharepoint/v3/contenttype/forms">
-  <Display>DocumentLibraryForm</Display>
-  <Edit>DocumentLibraryForm</Edit>
-  <New>DocumentLibraryForm</New>
-</FormTemplates>
 </file>
 
 <file path=customXml/item3.xml><?xml version="1.0" encoding="utf-8"?>
@@ -16725,19 +16725,19 @@
 </file>
 
 <file path=customXml/itemProps1.xml><?xml version="1.0" encoding="utf-8"?>
+<ds:datastoreItem xmlns:ds="http://schemas.openxmlformats.org/officeDocument/2006/customXml" ds:itemID="{1A449C04-64B3-4403-94B7-8D2284C38D1B}">
+  <ds:schemaRefs>
+    <ds:schemaRef ds:uri="http://schemas.microsoft.com/sharepoint/v3/contenttype/forms"/>
+  </ds:schemaRefs>
+</ds:datastoreItem>
+</file>
+
+<file path=customXml/itemProps2.xml><?xml version="1.0" encoding="utf-8"?>
 <ds:datastoreItem xmlns:ds="http://schemas.openxmlformats.org/officeDocument/2006/customXml" ds:itemID="{FBDEF148-1770-458F-8F5B-C3D0A278AA97}">
   <ds:schemaRefs>
     <ds:schemaRef ds:uri="http://schemas.microsoft.com/office/2006/metadata/properties"/>
     <ds:schemaRef ds:uri="http://schemas.microsoft.com/office/infopath/2007/PartnerControls"/>
     <ds:schemaRef ds:uri="71af3243-3dd4-4a8d-8c0d-dd76da1f02a5"/>
-  </ds:schemaRefs>
-</ds:datastoreItem>
-</file>
-
-<file path=customXml/itemProps2.xml><?xml version="1.0" encoding="utf-8"?>
-<ds:datastoreItem xmlns:ds="http://schemas.openxmlformats.org/officeDocument/2006/customXml" ds:itemID="{1A449C04-64B3-4403-94B7-8D2284C38D1B}">
-  <ds:schemaRefs>
-    <ds:schemaRef ds:uri="http://schemas.microsoft.com/sharepoint/v3/contenttype/forms"/>
   </ds:schemaRefs>
 </ds:datastoreItem>
 </file>

</xml_diff>